<commit_message>
Updated views article with physical and application viewpoints
</commit_message>
<xml_diff>
--- a/pages/engagement_model/media/ppt/Views_pictures.pptx
+++ b/pages/engagement_model/media/ppt/Views_pictures.pptx
@@ -5,7 +5,7 @@
     <p:sldMasterId id="2147483648" r:id="rId1"/>
   </p:sldMasterIdLst>
   <p:notesMasterIdLst>
-    <p:notesMasterId r:id="rId9"/>
+    <p:notesMasterId r:id="rId10"/>
   </p:notesMasterIdLst>
   <p:sldIdLst>
     <p:sldId id="449" r:id="rId2"/>
@@ -14,7 +14,8 @@
     <p:sldId id="258" r:id="rId5"/>
     <p:sldId id="259" r:id="rId6"/>
     <p:sldId id="454" r:id="rId7"/>
-    <p:sldId id="453" r:id="rId8"/>
+    <p:sldId id="455" r:id="rId8"/>
+    <p:sldId id="456" r:id="rId9"/>
   </p:sldIdLst>
   <p:sldSz cx="12192000" cy="6858000"/>
   <p:notesSz cx="6858000" cy="9144000"/>
@@ -203,7 +204,7 @@
           <a:p>
             <a:fld id="{1B656453-B7D9-4ACF-BD3C-ED9CE30BC7CF}" type="datetimeFigureOut">
               <a:rPr lang="sv-SE" smtClean="0"/>
-              <a:t>2022-11-04</a:t>
+              <a:t>2022-11-06</a:t>
             </a:fld>
             <a:endParaRPr lang="sv-SE"/>
           </a:p>
@@ -716,7 +717,7 @@
           <a:p>
             <a:fld id="{8001DB41-40DC-4A0C-8624-198CADB67B00}" type="datetimeFigureOut">
               <a:rPr lang="sv-SE" smtClean="0"/>
-              <a:t>2022-11-04</a:t>
+              <a:t>2022-11-06</a:t>
             </a:fld>
             <a:endParaRPr lang="sv-SE"/>
           </a:p>
@@ -914,7 +915,7 @@
           <a:p>
             <a:fld id="{8001DB41-40DC-4A0C-8624-198CADB67B00}" type="datetimeFigureOut">
               <a:rPr lang="sv-SE" smtClean="0"/>
-              <a:t>2022-11-04</a:t>
+              <a:t>2022-11-06</a:t>
             </a:fld>
             <a:endParaRPr lang="sv-SE"/>
           </a:p>
@@ -1122,7 +1123,7 @@
           <a:p>
             <a:fld id="{8001DB41-40DC-4A0C-8624-198CADB67B00}" type="datetimeFigureOut">
               <a:rPr lang="sv-SE" smtClean="0"/>
-              <a:t>2022-11-04</a:t>
+              <a:t>2022-11-06</a:t>
             </a:fld>
             <a:endParaRPr lang="sv-SE"/>
           </a:p>
@@ -1320,7 +1321,7 @@
           <a:p>
             <a:fld id="{8001DB41-40DC-4A0C-8624-198CADB67B00}" type="datetimeFigureOut">
               <a:rPr lang="sv-SE" smtClean="0"/>
-              <a:t>2022-11-04</a:t>
+              <a:t>2022-11-06</a:t>
             </a:fld>
             <a:endParaRPr lang="sv-SE"/>
           </a:p>
@@ -1595,7 +1596,7 @@
           <a:p>
             <a:fld id="{8001DB41-40DC-4A0C-8624-198CADB67B00}" type="datetimeFigureOut">
               <a:rPr lang="sv-SE" smtClean="0"/>
-              <a:t>2022-11-04</a:t>
+              <a:t>2022-11-06</a:t>
             </a:fld>
             <a:endParaRPr lang="sv-SE"/>
           </a:p>
@@ -1860,7 +1861,7 @@
           <a:p>
             <a:fld id="{8001DB41-40DC-4A0C-8624-198CADB67B00}" type="datetimeFigureOut">
               <a:rPr lang="sv-SE" smtClean="0"/>
-              <a:t>2022-11-04</a:t>
+              <a:t>2022-11-06</a:t>
             </a:fld>
             <a:endParaRPr lang="sv-SE"/>
           </a:p>
@@ -2272,7 +2273,7 @@
           <a:p>
             <a:fld id="{8001DB41-40DC-4A0C-8624-198CADB67B00}" type="datetimeFigureOut">
               <a:rPr lang="sv-SE" smtClean="0"/>
-              <a:t>2022-11-04</a:t>
+              <a:t>2022-11-06</a:t>
             </a:fld>
             <a:endParaRPr lang="sv-SE"/>
           </a:p>
@@ -2413,7 +2414,7 @@
           <a:p>
             <a:fld id="{8001DB41-40DC-4A0C-8624-198CADB67B00}" type="datetimeFigureOut">
               <a:rPr lang="sv-SE" smtClean="0"/>
-              <a:t>2022-11-04</a:t>
+              <a:t>2022-11-06</a:t>
             </a:fld>
             <a:endParaRPr lang="sv-SE"/>
           </a:p>
@@ -2526,7 +2527,7 @@
           <a:p>
             <a:fld id="{8001DB41-40DC-4A0C-8624-198CADB67B00}" type="datetimeFigureOut">
               <a:rPr lang="sv-SE" smtClean="0"/>
-              <a:t>2022-11-04</a:t>
+              <a:t>2022-11-06</a:t>
             </a:fld>
             <a:endParaRPr lang="sv-SE"/>
           </a:p>
@@ -2837,7 +2838,7 @@
           <a:p>
             <a:fld id="{8001DB41-40DC-4A0C-8624-198CADB67B00}" type="datetimeFigureOut">
               <a:rPr lang="sv-SE" smtClean="0"/>
-              <a:t>2022-11-04</a:t>
+              <a:t>2022-11-06</a:t>
             </a:fld>
             <a:endParaRPr lang="sv-SE"/>
           </a:p>
@@ -3125,7 +3126,7 @@
           <a:p>
             <a:fld id="{8001DB41-40DC-4A0C-8624-198CADB67B00}" type="datetimeFigureOut">
               <a:rPr lang="sv-SE" smtClean="0"/>
-              <a:t>2022-11-04</a:t>
+              <a:t>2022-11-06</a:t>
             </a:fld>
             <a:endParaRPr lang="sv-SE"/>
           </a:p>
@@ -3366,7 +3367,7 @@
           <a:p>
             <a:fld id="{8001DB41-40DC-4A0C-8624-198CADB67B00}" type="datetimeFigureOut">
               <a:rPr lang="sv-SE" smtClean="0"/>
-              <a:t>2022-11-04</a:t>
+              <a:t>2022-11-06</a:t>
             </a:fld>
             <a:endParaRPr lang="sv-SE"/>
           </a:p>
@@ -10604,41 +10605,1122 @@
           <a:chExt cx="0" cy="0"/>
         </a:xfrm>
       </p:grpSpPr>
-      <p:sp>
-        <p:nvSpPr>
-          <p:cNvPr id="2" name="Slide Number Placeholder 1">
-            <a:extLst>
-              <a:ext uri="{FF2B5EF4-FFF2-40B4-BE49-F238E27FC236}">
-                <a16:creationId xmlns:a16="http://schemas.microsoft.com/office/drawing/2014/main" id="{A5065B2C-541D-F7CF-CDED-DEFD6D3CFC60}"/>
-              </a:ext>
-            </a:extLst>
-          </p:cNvPr>
-          <p:cNvSpPr>
-            <a:spLocks noGrp="1"/>
-          </p:cNvSpPr>
-          <p:nvPr>
-            <p:ph type="sldNum" sz="quarter" idx="12"/>
-          </p:nvPr>
-        </p:nvSpPr>
-        <p:spPr/>
-        <p:txBody>
-          <a:bodyPr/>
-          <a:lstStyle/>
-          <a:p>
-            <a:fld id="{675CBC34-D68A-417C-A62D-60993CEB5261}" type="slidenum">
-              <a:rPr lang="en-US" smtClean="0"/>
-              <a:t>7</a:t>
-            </a:fld>
-            <a:endParaRPr lang="en-US"/>
-          </a:p>
-        </p:txBody>
-      </p:sp>
+      <p:grpSp>
+        <p:nvGrpSpPr>
+          <p:cNvPr id="7" name="Group 6">
+            <a:extLst>
+              <a:ext uri="{FF2B5EF4-FFF2-40B4-BE49-F238E27FC236}">
+                <a16:creationId xmlns:a16="http://schemas.microsoft.com/office/drawing/2014/main" id="{A2660142-0771-5D95-8E5B-004E40D75817}"/>
+              </a:ext>
+            </a:extLst>
+          </p:cNvPr>
+          <p:cNvGrpSpPr/>
+          <p:nvPr/>
+        </p:nvGrpSpPr>
+        <p:grpSpPr>
+          <a:xfrm>
+            <a:off x="769126" y="2411564"/>
+            <a:ext cx="1540603" cy="823704"/>
+            <a:chOff x="1436685" y="1368724"/>
+            <a:chExt cx="1540603" cy="823704"/>
+          </a:xfrm>
+        </p:grpSpPr>
+        <p:sp>
+          <p:nvSpPr>
+            <p:cNvPr id="24" name="Rektangel 23">
+              <a:extLst>
+                <a:ext uri="{FF2B5EF4-FFF2-40B4-BE49-F238E27FC236}">
+                  <a16:creationId xmlns:a16="http://schemas.microsoft.com/office/drawing/2014/main" id="{5A6DF37E-1538-CC80-1112-7AC8E70A18BD}"/>
+                </a:ext>
+              </a:extLst>
+            </p:cNvPr>
+            <p:cNvSpPr/>
+            <p:nvPr/>
+          </p:nvSpPr>
+          <p:spPr>
+            <a:xfrm>
+              <a:off x="1436685" y="1368724"/>
+              <a:ext cx="1400234" cy="823704"/>
+            </a:xfrm>
+            <a:prstGeom prst="rect">
+              <a:avLst/>
+            </a:prstGeom>
+            <a:solidFill>
+              <a:schemeClr val="accent1">
+                <a:lumMod val="75000"/>
+              </a:schemeClr>
+            </a:solidFill>
+          </p:spPr>
+          <p:style>
+            <a:lnRef idx="2">
+              <a:schemeClr val="accent1">
+                <a:shade val="50000"/>
+              </a:schemeClr>
+            </a:lnRef>
+            <a:fillRef idx="1">
+              <a:schemeClr val="accent1"/>
+            </a:fillRef>
+            <a:effectRef idx="0">
+              <a:schemeClr val="accent1"/>
+            </a:effectRef>
+            <a:fontRef idx="minor">
+              <a:schemeClr val="lt1"/>
+            </a:fontRef>
+          </p:style>
+          <p:txBody>
+            <a:bodyPr rtlCol="0" anchor="ctr"/>
+            <a:lstStyle/>
+            <a:p>
+              <a:pPr algn="ctr"/>
+              <a:r>
+                <a:rPr lang="sv-SE" sz="1600" dirty="0"/>
+                <a:t>OrderWeb</a:t>
+              </a:r>
+            </a:p>
+          </p:txBody>
+        </p:sp>
+        <p:sp>
+          <p:nvSpPr>
+            <p:cNvPr id="4" name="Rectangle 3">
+              <a:extLst>
+                <a:ext uri="{FF2B5EF4-FFF2-40B4-BE49-F238E27FC236}">
+                  <a16:creationId xmlns:a16="http://schemas.microsoft.com/office/drawing/2014/main" id="{1BC7A4EC-4187-BD65-537C-0755224CEE56}"/>
+                </a:ext>
+              </a:extLst>
+            </p:cNvPr>
+            <p:cNvSpPr/>
+            <p:nvPr/>
+          </p:nvSpPr>
+          <p:spPr>
+            <a:xfrm>
+              <a:off x="2580246" y="1406048"/>
+              <a:ext cx="397042" cy="122199"/>
+            </a:xfrm>
+            <a:prstGeom prst="rect">
+              <a:avLst/>
+            </a:prstGeom>
+            <a:ln>
+              <a:solidFill>
+                <a:schemeClr val="tx1"/>
+              </a:solidFill>
+            </a:ln>
+          </p:spPr>
+          <p:style>
+            <a:lnRef idx="2">
+              <a:schemeClr val="accent1">
+                <a:shade val="50000"/>
+              </a:schemeClr>
+            </a:lnRef>
+            <a:fillRef idx="1">
+              <a:schemeClr val="accent1"/>
+            </a:fillRef>
+            <a:effectRef idx="0">
+              <a:schemeClr val="accent1"/>
+            </a:effectRef>
+            <a:fontRef idx="minor">
+              <a:schemeClr val="lt1"/>
+            </a:fontRef>
+          </p:style>
+          <p:txBody>
+            <a:bodyPr rtlCol="0" anchor="ctr"/>
+            <a:lstStyle/>
+            <a:p>
+              <a:pPr algn="ctr"/>
+              <a:endParaRPr lang="sv-SE"/>
+            </a:p>
+          </p:txBody>
+        </p:sp>
+        <p:sp>
+          <p:nvSpPr>
+            <p:cNvPr id="6" name="Rectangle 5">
+              <a:extLst>
+                <a:ext uri="{FF2B5EF4-FFF2-40B4-BE49-F238E27FC236}">
+                  <a16:creationId xmlns:a16="http://schemas.microsoft.com/office/drawing/2014/main" id="{97A57E14-831F-A288-0894-8BE765B16E6A}"/>
+                </a:ext>
+              </a:extLst>
+            </p:cNvPr>
+            <p:cNvSpPr/>
+            <p:nvPr/>
+          </p:nvSpPr>
+          <p:spPr>
+            <a:xfrm>
+              <a:off x="2578295" y="1565469"/>
+              <a:ext cx="397042" cy="122198"/>
+            </a:xfrm>
+            <a:prstGeom prst="rect">
+              <a:avLst/>
+            </a:prstGeom>
+            <a:ln>
+              <a:solidFill>
+                <a:schemeClr val="tx1"/>
+              </a:solidFill>
+            </a:ln>
+          </p:spPr>
+          <p:style>
+            <a:lnRef idx="2">
+              <a:schemeClr val="accent1">
+                <a:shade val="50000"/>
+              </a:schemeClr>
+            </a:lnRef>
+            <a:fillRef idx="1">
+              <a:schemeClr val="accent1"/>
+            </a:fillRef>
+            <a:effectRef idx="0">
+              <a:schemeClr val="accent1"/>
+            </a:effectRef>
+            <a:fontRef idx="minor">
+              <a:schemeClr val="lt1"/>
+            </a:fontRef>
+          </p:style>
+          <p:txBody>
+            <a:bodyPr rtlCol="0" anchor="ctr"/>
+            <a:lstStyle/>
+            <a:p>
+              <a:pPr algn="ctr"/>
+              <a:endParaRPr lang="sv-SE"/>
+            </a:p>
+          </p:txBody>
+        </p:sp>
+      </p:grpSp>
+      <p:grpSp>
+        <p:nvGrpSpPr>
+          <p:cNvPr id="8" name="Group 7">
+            <a:extLst>
+              <a:ext uri="{FF2B5EF4-FFF2-40B4-BE49-F238E27FC236}">
+                <a16:creationId xmlns:a16="http://schemas.microsoft.com/office/drawing/2014/main" id="{EE3CE56B-16B2-BECD-56AA-A0192B1A362F}"/>
+              </a:ext>
+            </a:extLst>
+          </p:cNvPr>
+          <p:cNvGrpSpPr/>
+          <p:nvPr/>
+        </p:nvGrpSpPr>
+        <p:grpSpPr>
+          <a:xfrm>
+            <a:off x="3449388" y="2411564"/>
+            <a:ext cx="1540603" cy="823704"/>
+            <a:chOff x="1436685" y="1368724"/>
+            <a:chExt cx="1540603" cy="823704"/>
+          </a:xfrm>
+        </p:grpSpPr>
+        <p:sp>
+          <p:nvSpPr>
+            <p:cNvPr id="9" name="Rektangel 23">
+              <a:extLst>
+                <a:ext uri="{FF2B5EF4-FFF2-40B4-BE49-F238E27FC236}">
+                  <a16:creationId xmlns:a16="http://schemas.microsoft.com/office/drawing/2014/main" id="{5FA81C66-5EEF-BCEF-99E1-40B45152053B}"/>
+                </a:ext>
+              </a:extLst>
+            </p:cNvPr>
+            <p:cNvSpPr/>
+            <p:nvPr/>
+          </p:nvSpPr>
+          <p:spPr>
+            <a:xfrm>
+              <a:off x="1436685" y="1368724"/>
+              <a:ext cx="1400234" cy="823704"/>
+            </a:xfrm>
+            <a:prstGeom prst="rect">
+              <a:avLst/>
+            </a:prstGeom>
+            <a:solidFill>
+              <a:schemeClr val="accent1">
+                <a:lumMod val="75000"/>
+              </a:schemeClr>
+            </a:solidFill>
+          </p:spPr>
+          <p:style>
+            <a:lnRef idx="2">
+              <a:schemeClr val="accent1">
+                <a:shade val="50000"/>
+              </a:schemeClr>
+            </a:lnRef>
+            <a:fillRef idx="1">
+              <a:schemeClr val="accent1"/>
+            </a:fillRef>
+            <a:effectRef idx="0">
+              <a:schemeClr val="accent1"/>
+            </a:effectRef>
+            <a:fontRef idx="minor">
+              <a:schemeClr val="lt1"/>
+            </a:fontRef>
+          </p:style>
+          <p:txBody>
+            <a:bodyPr rtlCol="0" anchor="ctr"/>
+            <a:lstStyle/>
+            <a:p>
+              <a:pPr algn="ctr"/>
+              <a:r>
+                <a:rPr lang="sv-SE" sz="1600" dirty="0"/>
+                <a:t>OrderApi</a:t>
+              </a:r>
+            </a:p>
+          </p:txBody>
+        </p:sp>
+        <p:sp>
+          <p:nvSpPr>
+            <p:cNvPr id="10" name="Rectangle 9">
+              <a:extLst>
+                <a:ext uri="{FF2B5EF4-FFF2-40B4-BE49-F238E27FC236}">
+                  <a16:creationId xmlns:a16="http://schemas.microsoft.com/office/drawing/2014/main" id="{E818084B-653A-FC14-05AE-C4448EC3BA36}"/>
+                </a:ext>
+              </a:extLst>
+            </p:cNvPr>
+            <p:cNvSpPr/>
+            <p:nvPr/>
+          </p:nvSpPr>
+          <p:spPr>
+            <a:xfrm>
+              <a:off x="2580246" y="1406048"/>
+              <a:ext cx="397042" cy="122199"/>
+            </a:xfrm>
+            <a:prstGeom prst="rect">
+              <a:avLst/>
+            </a:prstGeom>
+          </p:spPr>
+          <p:style>
+            <a:lnRef idx="2">
+              <a:schemeClr val="accent1">
+                <a:shade val="50000"/>
+              </a:schemeClr>
+            </a:lnRef>
+            <a:fillRef idx="1">
+              <a:schemeClr val="accent1"/>
+            </a:fillRef>
+            <a:effectRef idx="0">
+              <a:schemeClr val="accent1"/>
+            </a:effectRef>
+            <a:fontRef idx="minor">
+              <a:schemeClr val="lt1"/>
+            </a:fontRef>
+          </p:style>
+          <p:txBody>
+            <a:bodyPr rtlCol="0" anchor="ctr"/>
+            <a:lstStyle/>
+            <a:p>
+              <a:pPr algn="ctr"/>
+              <a:endParaRPr lang="sv-SE"/>
+            </a:p>
+          </p:txBody>
+        </p:sp>
+        <p:sp>
+          <p:nvSpPr>
+            <p:cNvPr id="11" name="Rectangle 10">
+              <a:extLst>
+                <a:ext uri="{FF2B5EF4-FFF2-40B4-BE49-F238E27FC236}">
+                  <a16:creationId xmlns:a16="http://schemas.microsoft.com/office/drawing/2014/main" id="{59E089B5-2160-4C78-1883-B97F77B9F228}"/>
+                </a:ext>
+              </a:extLst>
+            </p:cNvPr>
+            <p:cNvSpPr/>
+            <p:nvPr/>
+          </p:nvSpPr>
+          <p:spPr>
+            <a:xfrm>
+              <a:off x="2578295" y="1565469"/>
+              <a:ext cx="397042" cy="122198"/>
+            </a:xfrm>
+            <a:prstGeom prst="rect">
+              <a:avLst/>
+            </a:prstGeom>
+          </p:spPr>
+          <p:style>
+            <a:lnRef idx="2">
+              <a:schemeClr val="accent1">
+                <a:shade val="50000"/>
+              </a:schemeClr>
+            </a:lnRef>
+            <a:fillRef idx="1">
+              <a:schemeClr val="accent1"/>
+            </a:fillRef>
+            <a:effectRef idx="0">
+              <a:schemeClr val="accent1"/>
+            </a:effectRef>
+            <a:fontRef idx="minor">
+              <a:schemeClr val="lt1"/>
+            </a:fontRef>
+          </p:style>
+          <p:txBody>
+            <a:bodyPr rtlCol="0" anchor="ctr"/>
+            <a:lstStyle/>
+            <a:p>
+              <a:pPr algn="ctr"/>
+              <a:endParaRPr lang="sv-SE"/>
+            </a:p>
+          </p:txBody>
+        </p:sp>
+      </p:grpSp>
+      <p:grpSp>
+        <p:nvGrpSpPr>
+          <p:cNvPr id="13" name="Group 12">
+            <a:extLst>
+              <a:ext uri="{FF2B5EF4-FFF2-40B4-BE49-F238E27FC236}">
+                <a16:creationId xmlns:a16="http://schemas.microsoft.com/office/drawing/2014/main" id="{9B4A6FEE-2229-341D-24E8-E5E8E5913348}"/>
+              </a:ext>
+            </a:extLst>
+          </p:cNvPr>
+          <p:cNvGrpSpPr/>
+          <p:nvPr/>
+        </p:nvGrpSpPr>
+        <p:grpSpPr>
+          <a:xfrm>
+            <a:off x="6627165" y="1461069"/>
+            <a:ext cx="1540603" cy="823704"/>
+            <a:chOff x="1436685" y="1368724"/>
+            <a:chExt cx="1540603" cy="823704"/>
+          </a:xfrm>
+        </p:grpSpPr>
+        <p:sp>
+          <p:nvSpPr>
+            <p:cNvPr id="15" name="Rektangel 23">
+              <a:extLst>
+                <a:ext uri="{FF2B5EF4-FFF2-40B4-BE49-F238E27FC236}">
+                  <a16:creationId xmlns:a16="http://schemas.microsoft.com/office/drawing/2014/main" id="{0D351771-9FD8-DE61-EB71-01A5809D13E0}"/>
+                </a:ext>
+              </a:extLst>
+            </p:cNvPr>
+            <p:cNvSpPr/>
+            <p:nvPr/>
+          </p:nvSpPr>
+          <p:spPr>
+            <a:xfrm>
+              <a:off x="1436685" y="1368724"/>
+              <a:ext cx="1400234" cy="823704"/>
+            </a:xfrm>
+            <a:prstGeom prst="rect">
+              <a:avLst/>
+            </a:prstGeom>
+            <a:solidFill>
+              <a:schemeClr val="accent1">
+                <a:lumMod val="75000"/>
+              </a:schemeClr>
+            </a:solidFill>
+          </p:spPr>
+          <p:style>
+            <a:lnRef idx="2">
+              <a:schemeClr val="accent1">
+                <a:shade val="50000"/>
+              </a:schemeClr>
+            </a:lnRef>
+            <a:fillRef idx="1">
+              <a:schemeClr val="accent1"/>
+            </a:fillRef>
+            <a:effectRef idx="0">
+              <a:schemeClr val="accent1"/>
+            </a:effectRef>
+            <a:fontRef idx="minor">
+              <a:schemeClr val="lt1"/>
+            </a:fontRef>
+          </p:style>
+          <p:txBody>
+            <a:bodyPr rtlCol="0" anchor="ctr"/>
+            <a:lstStyle/>
+            <a:p>
+              <a:pPr algn="ctr"/>
+              <a:r>
+                <a:rPr lang="sv-SE" sz="1600" dirty="0"/>
+                <a:t>OrderService</a:t>
+              </a:r>
+            </a:p>
+          </p:txBody>
+        </p:sp>
+        <p:sp>
+          <p:nvSpPr>
+            <p:cNvPr id="19" name="Rectangle 18">
+              <a:extLst>
+                <a:ext uri="{FF2B5EF4-FFF2-40B4-BE49-F238E27FC236}">
+                  <a16:creationId xmlns:a16="http://schemas.microsoft.com/office/drawing/2014/main" id="{6133B062-B72F-0650-1364-21EC42785266}"/>
+                </a:ext>
+              </a:extLst>
+            </p:cNvPr>
+            <p:cNvSpPr/>
+            <p:nvPr/>
+          </p:nvSpPr>
+          <p:spPr>
+            <a:xfrm>
+              <a:off x="2580246" y="1406048"/>
+              <a:ext cx="397042" cy="122199"/>
+            </a:xfrm>
+            <a:prstGeom prst="rect">
+              <a:avLst/>
+            </a:prstGeom>
+          </p:spPr>
+          <p:style>
+            <a:lnRef idx="2">
+              <a:schemeClr val="accent1">
+                <a:shade val="50000"/>
+              </a:schemeClr>
+            </a:lnRef>
+            <a:fillRef idx="1">
+              <a:schemeClr val="accent1"/>
+            </a:fillRef>
+            <a:effectRef idx="0">
+              <a:schemeClr val="accent1"/>
+            </a:effectRef>
+            <a:fontRef idx="minor">
+              <a:schemeClr val="lt1"/>
+            </a:fontRef>
+          </p:style>
+          <p:txBody>
+            <a:bodyPr rtlCol="0" anchor="ctr"/>
+            <a:lstStyle/>
+            <a:p>
+              <a:pPr algn="ctr"/>
+              <a:endParaRPr lang="sv-SE"/>
+            </a:p>
+          </p:txBody>
+        </p:sp>
+        <p:sp>
+          <p:nvSpPr>
+            <p:cNvPr id="20" name="Rectangle 19">
+              <a:extLst>
+                <a:ext uri="{FF2B5EF4-FFF2-40B4-BE49-F238E27FC236}">
+                  <a16:creationId xmlns:a16="http://schemas.microsoft.com/office/drawing/2014/main" id="{7FE6E056-BD75-866B-0013-0B507C7AE9D5}"/>
+                </a:ext>
+              </a:extLst>
+            </p:cNvPr>
+            <p:cNvSpPr/>
+            <p:nvPr/>
+          </p:nvSpPr>
+          <p:spPr>
+            <a:xfrm>
+              <a:off x="2578295" y="1565469"/>
+              <a:ext cx="397042" cy="122198"/>
+            </a:xfrm>
+            <a:prstGeom prst="rect">
+              <a:avLst/>
+            </a:prstGeom>
+          </p:spPr>
+          <p:style>
+            <a:lnRef idx="2">
+              <a:schemeClr val="accent1">
+                <a:shade val="50000"/>
+              </a:schemeClr>
+            </a:lnRef>
+            <a:fillRef idx="1">
+              <a:schemeClr val="accent1"/>
+            </a:fillRef>
+            <a:effectRef idx="0">
+              <a:schemeClr val="accent1"/>
+            </a:effectRef>
+            <a:fontRef idx="minor">
+              <a:schemeClr val="lt1"/>
+            </a:fontRef>
+          </p:style>
+          <p:txBody>
+            <a:bodyPr rtlCol="0" anchor="ctr"/>
+            <a:lstStyle/>
+            <a:p>
+              <a:pPr algn="ctr"/>
+              <a:endParaRPr lang="sv-SE"/>
+            </a:p>
+          </p:txBody>
+        </p:sp>
+      </p:grpSp>
+      <p:grpSp>
+        <p:nvGrpSpPr>
+          <p:cNvPr id="21" name="Group 20">
+            <a:extLst>
+              <a:ext uri="{FF2B5EF4-FFF2-40B4-BE49-F238E27FC236}">
+                <a16:creationId xmlns:a16="http://schemas.microsoft.com/office/drawing/2014/main" id="{121673D0-B4D7-FBA6-FA93-5A81754E1462}"/>
+              </a:ext>
+            </a:extLst>
+          </p:cNvPr>
+          <p:cNvGrpSpPr/>
+          <p:nvPr/>
+        </p:nvGrpSpPr>
+        <p:grpSpPr>
+          <a:xfrm>
+            <a:off x="9453866" y="2411564"/>
+            <a:ext cx="1540603" cy="823704"/>
+            <a:chOff x="1436685" y="1368724"/>
+            <a:chExt cx="1540603" cy="823704"/>
+          </a:xfrm>
+        </p:grpSpPr>
+        <p:sp>
+          <p:nvSpPr>
+            <p:cNvPr id="22" name="Rektangel 23">
+              <a:extLst>
+                <a:ext uri="{FF2B5EF4-FFF2-40B4-BE49-F238E27FC236}">
+                  <a16:creationId xmlns:a16="http://schemas.microsoft.com/office/drawing/2014/main" id="{F277B69D-029D-DEA8-82B6-B6829366541A}"/>
+                </a:ext>
+              </a:extLst>
+            </p:cNvPr>
+            <p:cNvSpPr/>
+            <p:nvPr/>
+          </p:nvSpPr>
+          <p:spPr>
+            <a:xfrm>
+              <a:off x="1436685" y="1368724"/>
+              <a:ext cx="1400234" cy="823704"/>
+            </a:xfrm>
+            <a:prstGeom prst="rect">
+              <a:avLst/>
+            </a:prstGeom>
+            <a:solidFill>
+              <a:schemeClr val="accent1">
+                <a:lumMod val="75000"/>
+              </a:schemeClr>
+            </a:solidFill>
+          </p:spPr>
+          <p:style>
+            <a:lnRef idx="2">
+              <a:schemeClr val="accent1">
+                <a:shade val="50000"/>
+              </a:schemeClr>
+            </a:lnRef>
+            <a:fillRef idx="1">
+              <a:schemeClr val="accent1"/>
+            </a:fillRef>
+            <a:effectRef idx="0">
+              <a:schemeClr val="accent1"/>
+            </a:effectRef>
+            <a:fontRef idx="minor">
+              <a:schemeClr val="lt1"/>
+            </a:fontRef>
+          </p:style>
+          <p:txBody>
+            <a:bodyPr rtlCol="0" anchor="ctr"/>
+            <a:lstStyle/>
+            <a:p>
+              <a:pPr algn="ctr"/>
+              <a:r>
+                <a:rPr lang="sv-SE" sz="1600" dirty="0"/>
+                <a:t>Order</a:t>
+              </a:r>
+            </a:p>
+            <a:p>
+              <a:pPr algn="ctr"/>
+              <a:r>
+                <a:rPr lang="sv-SE" sz="1600" dirty="0"/>
+                <a:t>Database</a:t>
+              </a:r>
+            </a:p>
+          </p:txBody>
+        </p:sp>
+        <p:sp>
+          <p:nvSpPr>
+            <p:cNvPr id="23" name="Rectangle 22">
+              <a:extLst>
+                <a:ext uri="{FF2B5EF4-FFF2-40B4-BE49-F238E27FC236}">
+                  <a16:creationId xmlns:a16="http://schemas.microsoft.com/office/drawing/2014/main" id="{6F327724-5F0C-4998-5081-2E851F63FA3B}"/>
+                </a:ext>
+              </a:extLst>
+            </p:cNvPr>
+            <p:cNvSpPr/>
+            <p:nvPr/>
+          </p:nvSpPr>
+          <p:spPr>
+            <a:xfrm>
+              <a:off x="2580246" y="1406048"/>
+              <a:ext cx="397042" cy="122199"/>
+            </a:xfrm>
+            <a:prstGeom prst="rect">
+              <a:avLst/>
+            </a:prstGeom>
+          </p:spPr>
+          <p:style>
+            <a:lnRef idx="2">
+              <a:schemeClr val="accent1">
+                <a:shade val="50000"/>
+              </a:schemeClr>
+            </a:lnRef>
+            <a:fillRef idx="1">
+              <a:schemeClr val="accent1"/>
+            </a:fillRef>
+            <a:effectRef idx="0">
+              <a:schemeClr val="accent1"/>
+            </a:effectRef>
+            <a:fontRef idx="minor">
+              <a:schemeClr val="lt1"/>
+            </a:fontRef>
+          </p:style>
+          <p:txBody>
+            <a:bodyPr rtlCol="0" anchor="ctr"/>
+            <a:lstStyle/>
+            <a:p>
+              <a:pPr algn="ctr"/>
+              <a:endParaRPr lang="sv-SE"/>
+            </a:p>
+          </p:txBody>
+        </p:sp>
+        <p:sp>
+          <p:nvSpPr>
+            <p:cNvPr id="25" name="Rectangle 24">
+              <a:extLst>
+                <a:ext uri="{FF2B5EF4-FFF2-40B4-BE49-F238E27FC236}">
+                  <a16:creationId xmlns:a16="http://schemas.microsoft.com/office/drawing/2014/main" id="{1F2E7FD3-5230-6A58-E53F-B04C7F3EC13D}"/>
+                </a:ext>
+              </a:extLst>
+            </p:cNvPr>
+            <p:cNvSpPr/>
+            <p:nvPr/>
+          </p:nvSpPr>
+          <p:spPr>
+            <a:xfrm>
+              <a:off x="2578295" y="1565469"/>
+              <a:ext cx="397042" cy="122198"/>
+            </a:xfrm>
+            <a:prstGeom prst="rect">
+              <a:avLst/>
+            </a:prstGeom>
+          </p:spPr>
+          <p:style>
+            <a:lnRef idx="2">
+              <a:schemeClr val="accent1">
+                <a:shade val="50000"/>
+              </a:schemeClr>
+            </a:lnRef>
+            <a:fillRef idx="1">
+              <a:schemeClr val="accent1"/>
+            </a:fillRef>
+            <a:effectRef idx="0">
+              <a:schemeClr val="accent1"/>
+            </a:effectRef>
+            <a:fontRef idx="minor">
+              <a:schemeClr val="lt1"/>
+            </a:fontRef>
+          </p:style>
+          <p:txBody>
+            <a:bodyPr rtlCol="0" anchor="ctr"/>
+            <a:lstStyle/>
+            <a:p>
+              <a:pPr algn="ctr"/>
+              <a:endParaRPr lang="sv-SE"/>
+            </a:p>
+          </p:txBody>
+        </p:sp>
+      </p:grpSp>
+      <p:grpSp>
+        <p:nvGrpSpPr>
+          <p:cNvPr id="26" name="Group 25">
+            <a:extLst>
+              <a:ext uri="{FF2B5EF4-FFF2-40B4-BE49-F238E27FC236}">
+                <a16:creationId xmlns:a16="http://schemas.microsoft.com/office/drawing/2014/main" id="{FF21E7BB-D54D-0E99-508B-DE8AC3DFEB9B}"/>
+              </a:ext>
+            </a:extLst>
+          </p:cNvPr>
+          <p:cNvGrpSpPr/>
+          <p:nvPr/>
+        </p:nvGrpSpPr>
+        <p:grpSpPr>
+          <a:xfrm>
+            <a:off x="6625214" y="3315159"/>
+            <a:ext cx="1540603" cy="823704"/>
+            <a:chOff x="1436685" y="1368724"/>
+            <a:chExt cx="1540603" cy="823704"/>
+          </a:xfrm>
+        </p:grpSpPr>
+        <p:sp>
+          <p:nvSpPr>
+            <p:cNvPr id="27" name="Rektangel 23">
+              <a:extLst>
+                <a:ext uri="{FF2B5EF4-FFF2-40B4-BE49-F238E27FC236}">
+                  <a16:creationId xmlns:a16="http://schemas.microsoft.com/office/drawing/2014/main" id="{2E8F7479-3563-93FB-8388-19BC05D49E41}"/>
+                </a:ext>
+              </a:extLst>
+            </p:cNvPr>
+            <p:cNvSpPr/>
+            <p:nvPr/>
+          </p:nvSpPr>
+          <p:spPr>
+            <a:xfrm>
+              <a:off x="1436685" y="1368724"/>
+              <a:ext cx="1400234" cy="823704"/>
+            </a:xfrm>
+            <a:prstGeom prst="rect">
+              <a:avLst/>
+            </a:prstGeom>
+            <a:solidFill>
+              <a:schemeClr val="accent1">
+                <a:lumMod val="75000"/>
+              </a:schemeClr>
+            </a:solidFill>
+          </p:spPr>
+          <p:style>
+            <a:lnRef idx="2">
+              <a:schemeClr val="accent1">
+                <a:shade val="50000"/>
+              </a:schemeClr>
+            </a:lnRef>
+            <a:fillRef idx="1">
+              <a:schemeClr val="accent1"/>
+            </a:fillRef>
+            <a:effectRef idx="0">
+              <a:schemeClr val="accent1"/>
+            </a:effectRef>
+            <a:fontRef idx="minor">
+              <a:schemeClr val="lt1"/>
+            </a:fontRef>
+          </p:style>
+          <p:txBody>
+            <a:bodyPr rtlCol="0" anchor="ctr"/>
+            <a:lstStyle/>
+            <a:p>
+              <a:pPr algn="ctr"/>
+              <a:r>
+                <a:rPr lang="sv-SE" sz="1600" dirty="0"/>
+                <a:t>OrderService</a:t>
+              </a:r>
+            </a:p>
+          </p:txBody>
+        </p:sp>
+        <p:sp>
+          <p:nvSpPr>
+            <p:cNvPr id="28" name="Rectangle 27">
+              <a:extLst>
+                <a:ext uri="{FF2B5EF4-FFF2-40B4-BE49-F238E27FC236}">
+                  <a16:creationId xmlns:a16="http://schemas.microsoft.com/office/drawing/2014/main" id="{7FDB18FF-E852-E7C8-F3C2-E213E6B0F6B1}"/>
+                </a:ext>
+              </a:extLst>
+            </p:cNvPr>
+            <p:cNvSpPr/>
+            <p:nvPr/>
+          </p:nvSpPr>
+          <p:spPr>
+            <a:xfrm>
+              <a:off x="2580246" y="1406048"/>
+              <a:ext cx="397042" cy="122199"/>
+            </a:xfrm>
+            <a:prstGeom prst="rect">
+              <a:avLst/>
+            </a:prstGeom>
+          </p:spPr>
+          <p:style>
+            <a:lnRef idx="2">
+              <a:schemeClr val="accent1">
+                <a:shade val="50000"/>
+              </a:schemeClr>
+            </a:lnRef>
+            <a:fillRef idx="1">
+              <a:schemeClr val="accent1"/>
+            </a:fillRef>
+            <a:effectRef idx="0">
+              <a:schemeClr val="accent1"/>
+            </a:effectRef>
+            <a:fontRef idx="minor">
+              <a:schemeClr val="lt1"/>
+            </a:fontRef>
+          </p:style>
+          <p:txBody>
+            <a:bodyPr rtlCol="0" anchor="ctr"/>
+            <a:lstStyle/>
+            <a:p>
+              <a:pPr algn="ctr"/>
+              <a:endParaRPr lang="sv-SE"/>
+            </a:p>
+          </p:txBody>
+        </p:sp>
+        <p:sp>
+          <p:nvSpPr>
+            <p:cNvPr id="30" name="Rectangle 29">
+              <a:extLst>
+                <a:ext uri="{FF2B5EF4-FFF2-40B4-BE49-F238E27FC236}">
+                  <a16:creationId xmlns:a16="http://schemas.microsoft.com/office/drawing/2014/main" id="{8E297E42-9081-3C92-3179-C6DD2DBBFB34}"/>
+                </a:ext>
+              </a:extLst>
+            </p:cNvPr>
+            <p:cNvSpPr/>
+            <p:nvPr/>
+          </p:nvSpPr>
+          <p:spPr>
+            <a:xfrm>
+              <a:off x="2578295" y="1565469"/>
+              <a:ext cx="397042" cy="122198"/>
+            </a:xfrm>
+            <a:prstGeom prst="rect">
+              <a:avLst/>
+            </a:prstGeom>
+          </p:spPr>
+          <p:style>
+            <a:lnRef idx="2">
+              <a:schemeClr val="accent1">
+                <a:shade val="50000"/>
+              </a:schemeClr>
+            </a:lnRef>
+            <a:fillRef idx="1">
+              <a:schemeClr val="accent1"/>
+            </a:fillRef>
+            <a:effectRef idx="0">
+              <a:schemeClr val="accent1"/>
+            </a:effectRef>
+            <a:fontRef idx="minor">
+              <a:schemeClr val="lt1"/>
+            </a:fontRef>
+          </p:style>
+          <p:txBody>
+            <a:bodyPr rtlCol="0" anchor="ctr"/>
+            <a:lstStyle/>
+            <a:p>
+              <a:pPr algn="ctr"/>
+              <a:endParaRPr lang="sv-SE"/>
+            </a:p>
+          </p:txBody>
+        </p:sp>
+      </p:grpSp>
+      <p:cxnSp>
+        <p:nvCxnSpPr>
+          <p:cNvPr id="32" name="Straight Arrow Connector 31">
+            <a:extLst>
+              <a:ext uri="{FF2B5EF4-FFF2-40B4-BE49-F238E27FC236}">
+                <a16:creationId xmlns:a16="http://schemas.microsoft.com/office/drawing/2014/main" id="{72C80675-4639-E2A5-6FE9-52E3831EAB34}"/>
+              </a:ext>
+            </a:extLst>
+          </p:cNvPr>
+          <p:cNvCxnSpPr>
+            <a:stCxn id="24" idx="3"/>
+            <a:endCxn id="9" idx="1"/>
+          </p:cNvCxnSpPr>
+          <p:nvPr/>
+        </p:nvCxnSpPr>
+        <p:spPr>
+          <a:xfrm>
+            <a:off x="2169360" y="2823416"/>
+            <a:ext cx="1280028" cy="0"/>
+          </a:xfrm>
+          <a:prstGeom prst="straightConnector1">
+            <a:avLst/>
+          </a:prstGeom>
+          <a:ln w="38100">
+            <a:solidFill>
+              <a:schemeClr val="tx1"/>
+            </a:solidFill>
+            <a:prstDash val="dash"/>
+            <a:tailEnd type="triangle"/>
+          </a:ln>
+        </p:spPr>
+        <p:style>
+          <a:lnRef idx="1">
+            <a:schemeClr val="accent1"/>
+          </a:lnRef>
+          <a:fillRef idx="0">
+            <a:schemeClr val="accent1"/>
+          </a:fillRef>
+          <a:effectRef idx="0">
+            <a:schemeClr val="accent1"/>
+          </a:effectRef>
+          <a:fontRef idx="minor">
+            <a:schemeClr val="tx1"/>
+          </a:fontRef>
+        </p:style>
+      </p:cxnSp>
+      <p:cxnSp>
+        <p:nvCxnSpPr>
+          <p:cNvPr id="35" name="Connector: Elbow 34">
+            <a:extLst>
+              <a:ext uri="{FF2B5EF4-FFF2-40B4-BE49-F238E27FC236}">
+                <a16:creationId xmlns:a16="http://schemas.microsoft.com/office/drawing/2014/main" id="{A2441AE4-E8AA-C6BF-BB7E-C16235D742BC}"/>
+              </a:ext>
+            </a:extLst>
+          </p:cNvPr>
+          <p:cNvCxnSpPr>
+            <a:cxnSpLocks/>
+          </p:cNvCxnSpPr>
+          <p:nvPr/>
+        </p:nvCxnSpPr>
+        <p:spPr>
+          <a:xfrm flipV="1">
+            <a:off x="4849622" y="1824793"/>
+            <a:ext cx="1777543" cy="950495"/>
+          </a:xfrm>
+          <a:prstGeom prst="bentConnector3">
+            <a:avLst/>
+          </a:prstGeom>
+          <a:ln w="38100">
+            <a:solidFill>
+              <a:schemeClr val="tx1"/>
+            </a:solidFill>
+            <a:prstDash val="dash"/>
+            <a:tailEnd type="triangle"/>
+          </a:ln>
+        </p:spPr>
+        <p:style>
+          <a:lnRef idx="1">
+            <a:schemeClr val="accent1"/>
+          </a:lnRef>
+          <a:fillRef idx="0">
+            <a:schemeClr val="accent1"/>
+          </a:fillRef>
+          <a:effectRef idx="0">
+            <a:schemeClr val="accent1"/>
+          </a:effectRef>
+          <a:fontRef idx="minor">
+            <a:schemeClr val="tx1"/>
+          </a:fontRef>
+        </p:style>
+      </p:cxnSp>
+      <p:cxnSp>
+        <p:nvCxnSpPr>
+          <p:cNvPr id="38" name="Connector: Elbow 37">
+            <a:extLst>
+              <a:ext uri="{FF2B5EF4-FFF2-40B4-BE49-F238E27FC236}">
+                <a16:creationId xmlns:a16="http://schemas.microsoft.com/office/drawing/2014/main" id="{4DFC7B0D-FD68-774F-6E65-8DB7D8A06A3A}"/>
+              </a:ext>
+            </a:extLst>
+          </p:cNvPr>
+          <p:cNvCxnSpPr>
+            <a:cxnSpLocks/>
+          </p:cNvCxnSpPr>
+          <p:nvPr/>
+        </p:nvCxnSpPr>
+        <p:spPr>
+          <a:xfrm>
+            <a:off x="4849622" y="2895608"/>
+            <a:ext cx="1775592" cy="903595"/>
+          </a:xfrm>
+          <a:prstGeom prst="bentConnector3">
+            <a:avLst/>
+          </a:prstGeom>
+          <a:ln w="38100">
+            <a:solidFill>
+              <a:schemeClr val="tx1"/>
+            </a:solidFill>
+            <a:prstDash val="dash"/>
+            <a:tailEnd type="triangle"/>
+          </a:ln>
+        </p:spPr>
+        <p:style>
+          <a:lnRef idx="1">
+            <a:schemeClr val="accent1"/>
+          </a:lnRef>
+          <a:fillRef idx="0">
+            <a:schemeClr val="accent1"/>
+          </a:fillRef>
+          <a:effectRef idx="0">
+            <a:schemeClr val="accent1"/>
+          </a:effectRef>
+          <a:fontRef idx="minor">
+            <a:schemeClr val="tx1"/>
+          </a:fontRef>
+        </p:style>
+      </p:cxnSp>
+      <p:cxnSp>
+        <p:nvCxnSpPr>
+          <p:cNvPr id="44" name="Connector: Elbow 43">
+            <a:extLst>
+              <a:ext uri="{FF2B5EF4-FFF2-40B4-BE49-F238E27FC236}">
+                <a16:creationId xmlns:a16="http://schemas.microsoft.com/office/drawing/2014/main" id="{DFAB61BA-2E88-83B8-A13A-0CC133DF39DD}"/>
+              </a:ext>
+            </a:extLst>
+          </p:cNvPr>
+          <p:cNvCxnSpPr>
+            <a:stCxn id="15" idx="3"/>
+            <a:endCxn id="22" idx="0"/>
+          </p:cNvCxnSpPr>
+          <p:nvPr/>
+        </p:nvCxnSpPr>
+        <p:spPr>
+          <a:xfrm>
+            <a:off x="8027399" y="1872921"/>
+            <a:ext cx="2126584" cy="538643"/>
+          </a:xfrm>
+          <a:prstGeom prst="bentConnector2">
+            <a:avLst/>
+          </a:prstGeom>
+          <a:ln w="38100">
+            <a:solidFill>
+              <a:schemeClr val="tx1"/>
+            </a:solidFill>
+            <a:prstDash val="dash"/>
+            <a:tailEnd type="triangle"/>
+          </a:ln>
+        </p:spPr>
+        <p:style>
+          <a:lnRef idx="1">
+            <a:schemeClr val="accent1"/>
+          </a:lnRef>
+          <a:fillRef idx="0">
+            <a:schemeClr val="accent1"/>
+          </a:fillRef>
+          <a:effectRef idx="0">
+            <a:schemeClr val="accent1"/>
+          </a:effectRef>
+          <a:fontRef idx="minor">
+            <a:schemeClr val="tx1"/>
+          </a:fontRef>
+        </p:style>
+      </p:cxnSp>
+      <p:cxnSp>
+        <p:nvCxnSpPr>
+          <p:cNvPr id="49" name="Connector: Elbow 48">
+            <a:extLst>
+              <a:ext uri="{FF2B5EF4-FFF2-40B4-BE49-F238E27FC236}">
+                <a16:creationId xmlns:a16="http://schemas.microsoft.com/office/drawing/2014/main" id="{198F2D16-1527-A38F-7276-03BC92048F90}"/>
+              </a:ext>
+            </a:extLst>
+          </p:cNvPr>
+          <p:cNvCxnSpPr>
+            <a:stCxn id="27" idx="3"/>
+            <a:endCxn id="22" idx="2"/>
+          </p:cNvCxnSpPr>
+          <p:nvPr/>
+        </p:nvCxnSpPr>
+        <p:spPr>
+          <a:xfrm flipV="1">
+            <a:off x="8025448" y="3235268"/>
+            <a:ext cx="2128535" cy="491743"/>
+          </a:xfrm>
+          <a:prstGeom prst="bentConnector2">
+            <a:avLst/>
+          </a:prstGeom>
+          <a:ln w="38100">
+            <a:solidFill>
+              <a:schemeClr val="tx1"/>
+            </a:solidFill>
+            <a:prstDash val="dash"/>
+            <a:tailEnd type="triangle"/>
+          </a:ln>
+        </p:spPr>
+        <p:style>
+          <a:lnRef idx="1">
+            <a:schemeClr val="accent1"/>
+          </a:lnRef>
+          <a:fillRef idx="0">
+            <a:schemeClr val="accent1"/>
+          </a:fillRef>
+          <a:effectRef idx="0">
+            <a:schemeClr val="accent1"/>
+          </a:effectRef>
+          <a:fontRef idx="minor">
+            <a:schemeClr val="tx1"/>
+          </a:fontRef>
+        </p:style>
+      </p:cxnSp>
+    </p:spTree>
+    <p:extLst>
+      <p:ext uri="{BB962C8B-B14F-4D97-AF65-F5344CB8AC3E}">
+        <p14:creationId xmlns:p14="http://schemas.microsoft.com/office/powerpoint/2010/main" val="3439176857"/>
+      </p:ext>
+    </p:extLst>
+  </p:cSld>
+  <p:clrMapOvr>
+    <a:masterClrMapping/>
+  </p:clrMapOvr>
+</p:sld>
+</file>
+
+<file path=ppt/slides/slide8.xml><?xml version="1.0" encoding="utf-8"?>
+<p:sld xmlns:a="http://schemas.openxmlformats.org/drawingml/2006/main" xmlns:r="http://schemas.openxmlformats.org/officeDocument/2006/relationships" xmlns:p="http://schemas.openxmlformats.org/presentationml/2006/main">
+  <p:cSld>
+    <p:spTree>
+      <p:nvGrpSpPr>
+        <p:cNvPr id="1" name=""/>
+        <p:cNvGrpSpPr/>
+        <p:nvPr/>
+      </p:nvGrpSpPr>
+      <p:grpSpPr>
+        <a:xfrm>
+          <a:off x="0" y="0"/>
+          <a:ext cx="0" cy="0"/>
+          <a:chOff x="0" y="0"/>
+          <a:chExt cx="0" cy="0"/>
+        </a:xfrm>
+      </p:grpSpPr>
       <p:pic>
         <p:nvPicPr>
-          <p:cNvPr id="4" name="Picture 3">
-            <a:extLst>
-              <a:ext uri="{FF2B5EF4-FFF2-40B4-BE49-F238E27FC236}">
-                <a16:creationId xmlns:a16="http://schemas.microsoft.com/office/drawing/2014/main" id="{5F9ACA6E-C7DE-F2F7-5842-D783BE597EA1}"/>
+          <p:cNvPr id="34" name="Picture 33">
+            <a:extLst>
+              <a:ext uri="{FF2B5EF4-FFF2-40B4-BE49-F238E27FC236}">
+                <a16:creationId xmlns:a16="http://schemas.microsoft.com/office/drawing/2014/main" id="{9A4460B4-4416-01EA-5E0E-68062D6F7C28}"/>
               </a:ext>
             </a:extLst>
           </p:cNvPr>
@@ -10655,8 +11737,8 @@
         </p:blipFill>
         <p:spPr>
           <a:xfrm>
-            <a:off x="1481714" y="1681381"/>
-            <a:ext cx="9228571" cy="3495238"/>
+            <a:off x="2795587" y="1357312"/>
+            <a:ext cx="6600825" cy="4143375"/>
           </a:xfrm>
           <a:prstGeom prst="rect">
             <a:avLst/>
@@ -10666,7 +11748,7 @@
     </p:spTree>
     <p:extLst>
       <p:ext uri="{BB962C8B-B14F-4D97-AF65-F5344CB8AC3E}">
-        <p14:creationId xmlns:p14="http://schemas.microsoft.com/office/powerpoint/2010/main" val="2737267629"/>
+        <p14:creationId xmlns:p14="http://schemas.microsoft.com/office/powerpoint/2010/main" val="2819211686"/>
       </p:ext>
     </p:extLst>
   </p:cSld>

</xml_diff>